<commit_message>
Add Dist. features to ppt
</commit_message>
<xml_diff>
--- a/Document/SPS_Presentation.pptx
+++ b/Document/SPS_Presentation.pptx
@@ -5,7 +5,7 @@
     <p:sldMasterId id="2147483660" r:id="rId1"/>
   </p:sldMasterIdLst>
   <p:notesMasterIdLst>
-    <p:notesMasterId r:id="rId9"/>
+    <p:notesMasterId r:id="rId8"/>
   </p:notesMasterIdLst>
   <p:sldIdLst>
     <p:sldId id="256" r:id="rId2"/>
@@ -13,8 +13,7 @@
     <p:sldId id="262" r:id="rId4"/>
     <p:sldId id="259" r:id="rId5"/>
     <p:sldId id="260" r:id="rId6"/>
-    <p:sldId id="257" r:id="rId7"/>
-    <p:sldId id="258" r:id="rId8"/>
+    <p:sldId id="263" r:id="rId7"/>
   </p:sldIdLst>
   <p:sldSz cx="9144000" cy="6858000" type="screen4x3"/>
   <p:notesSz cx="6858000" cy="9144000"/>
@@ -809,6 +808,90 @@
     <p:extLst>
       <p:ext uri="{BB962C8B-B14F-4D97-AF65-F5344CB8AC3E}">
         <p14:creationId xmlns:p14="http://schemas.microsoft.com/office/powerpoint/2010/main" val="4052184756"/>
+      </p:ext>
+    </p:extLst>
+  </p:cSld>
+  <p:clrMapOvr>
+    <a:masterClrMapping/>
+  </p:clrMapOvr>
+</p:notes>
+</file>
+
+<file path=ppt/notesSlides/notesSlide5.xml><?xml version="1.0" encoding="utf-8"?>
+<p:notes xmlns:a="http://schemas.openxmlformats.org/drawingml/2006/main" xmlns:r="http://schemas.openxmlformats.org/officeDocument/2006/relationships" xmlns:p="http://schemas.openxmlformats.org/presentationml/2006/main">
+  <p:cSld>
+    <p:spTree>
+      <p:nvGrpSpPr>
+        <p:cNvPr id="1" name=""/>
+        <p:cNvGrpSpPr/>
+        <p:nvPr/>
+      </p:nvGrpSpPr>
+      <p:grpSpPr>
+        <a:xfrm>
+          <a:off x="0" y="0"/>
+          <a:ext cx="0" cy="0"/>
+          <a:chOff x="0" y="0"/>
+          <a:chExt cx="0" cy="0"/>
+        </a:xfrm>
+      </p:grpSpPr>
+      <p:sp>
+        <p:nvSpPr>
+          <p:cNvPr id="2" name="Pladsholder til diasbillede 1"/>
+          <p:cNvSpPr>
+            <a:spLocks noGrp="1" noRot="1" noChangeAspect="1"/>
+          </p:cNvSpPr>
+          <p:nvPr>
+            <p:ph type="sldImg"/>
+          </p:nvPr>
+        </p:nvSpPr>
+        <p:spPr/>
+      </p:sp>
+      <p:sp>
+        <p:nvSpPr>
+          <p:cNvPr id="3" name="Pladsholder til noter 2"/>
+          <p:cNvSpPr>
+            <a:spLocks noGrp="1"/>
+          </p:cNvSpPr>
+          <p:nvPr>
+            <p:ph type="body" idx="1"/>
+          </p:nvPr>
+        </p:nvSpPr>
+        <p:spPr/>
+        <p:txBody>
+          <a:bodyPr/>
+          <a:lstStyle/>
+          <a:p>
+            <a:endParaRPr lang="en-US" dirty="0"/>
+          </a:p>
+        </p:txBody>
+      </p:sp>
+      <p:sp>
+        <p:nvSpPr>
+          <p:cNvPr id="4" name="Pladsholder til diasnummer 3"/>
+          <p:cNvSpPr>
+            <a:spLocks noGrp="1"/>
+          </p:cNvSpPr>
+          <p:nvPr>
+            <p:ph type="sldNum" sz="quarter" idx="10"/>
+          </p:nvPr>
+        </p:nvSpPr>
+        <p:spPr/>
+        <p:txBody>
+          <a:bodyPr/>
+          <a:lstStyle/>
+          <a:p>
+            <a:fld id="{EAA68364-80D8-4CEC-A5C7-CA9F0097DAD8}" type="slidenum">
+              <a:rPr lang="en-US" smtClean="0"/>
+              <a:t>6</a:t>
+            </a:fld>
+            <a:endParaRPr lang="en-US" dirty="0"/>
+          </a:p>
+        </p:txBody>
+      </p:sp>
+    </p:spTree>
+    <p:extLst>
+      <p:ext uri="{BB962C8B-B14F-4D97-AF65-F5344CB8AC3E}">
+        <p14:creationId xmlns:p14="http://schemas.microsoft.com/office/powerpoint/2010/main" val="1137606215"/>
       </p:ext>
     </p:extLst>
   </p:cSld>
@@ -4459,7 +4542,7 @@
         </p:blipFill>
         <p:spPr>
           <a:xfrm>
-            <a:off x="1187624" y="1916832"/>
+            <a:off x="1187624" y="1628800"/>
             <a:ext cx="6732239" cy="4015177"/>
           </a:xfrm>
           <a:prstGeom prst="rect">
@@ -4544,9 +4627,76 @@
           <a:p>
             <a:r>
               <a:rPr lang="en-US" dirty="0" smtClean="0"/>
-              <a:t>System excelences</a:t>
-            </a:r>
-            <a:endParaRPr lang="en-US" dirty="0"/>
+              <a:t>Automatic and Semi-automatic operation </a:t>
+            </a:r>
+          </a:p>
+          <a:p>
+            <a:pPr lvl="1"/>
+            <a:r>
+              <a:rPr lang="en-US" dirty="0" smtClean="0"/>
+              <a:t>Lessens pilot load</a:t>
+            </a:r>
+          </a:p>
+          <a:p>
+            <a:pPr marL="457200" lvl="1" indent="0">
+              <a:buNone/>
+            </a:pPr>
+            <a:endParaRPr lang="en-US" dirty="0" smtClean="0"/>
+          </a:p>
+          <a:p>
+            <a:r>
+              <a:rPr lang="en-US" dirty="0" smtClean="0"/>
+              <a:t>Intelligent selection of dispensing patterns</a:t>
+            </a:r>
+          </a:p>
+          <a:p>
+            <a:pPr lvl="1"/>
+            <a:r>
+              <a:rPr lang="en-US" dirty="0" smtClean="0"/>
+              <a:t>Optimal coverage for all threats</a:t>
+            </a:r>
+          </a:p>
+          <a:p>
+            <a:endParaRPr lang="en-US" dirty="0" smtClean="0"/>
+          </a:p>
+          <a:p>
+            <a:r>
+              <a:rPr lang="en-US" dirty="0" smtClean="0"/>
+              <a:t>Direct audio cues in pilot headset</a:t>
+            </a:r>
+          </a:p>
+          <a:p>
+            <a:pPr lvl="1"/>
+            <a:r>
+              <a:rPr lang="en-US" dirty="0" smtClean="0"/>
+              <a:t>Faster and more direct </a:t>
+            </a:r>
+            <a:r>
+              <a:rPr lang="en-US" smtClean="0"/>
+              <a:t>threat response</a:t>
+            </a:r>
+            <a:r>
+              <a:rPr lang="en-US" dirty="0" smtClean="0"/>
+              <a:t/>
+            </a:r>
+            <a:br>
+              <a:rPr lang="en-US" dirty="0" smtClean="0"/>
+            </a:br>
+            <a:r>
+              <a:rPr lang="en-US" dirty="0" smtClean="0"/>
+              <a:t/>
+            </a:r>
+            <a:br>
+              <a:rPr lang="en-US" dirty="0" smtClean="0"/>
+            </a:br>
+            <a:r>
+              <a:rPr lang="en-US" dirty="0" smtClean="0"/>
+              <a:t/>
+            </a:r>
+            <a:br>
+              <a:rPr lang="en-US" dirty="0" smtClean="0"/>
+            </a:br>
+            <a:endParaRPr lang="en-US" dirty="0" smtClean="0"/>
           </a:p>
         </p:txBody>
       </p:sp>
@@ -4676,123 +4826,10 @@
           <a:chExt cx="0" cy="0"/>
         </a:xfrm>
       </p:grpSpPr>
-      <p:sp>
-        <p:nvSpPr>
-          <p:cNvPr id="2" name="Titel 1"/>
-          <p:cNvSpPr>
-            <a:spLocks noGrp="1"/>
-          </p:cNvSpPr>
-          <p:nvPr>
-            <p:ph type="title"/>
-          </p:nvPr>
-        </p:nvSpPr>
-        <p:spPr/>
-        <p:txBody>
-          <a:bodyPr/>
-          <a:lstStyle/>
-          <a:p>
-            <a:endParaRPr lang="da-DK" dirty="0"/>
-          </a:p>
-        </p:txBody>
-      </p:sp>
-      <p:sp>
-        <p:nvSpPr>
-          <p:cNvPr id="3" name="Pladsholder til tekst 2"/>
-          <p:cNvSpPr>
-            <a:spLocks noGrp="1"/>
-          </p:cNvSpPr>
-          <p:nvPr>
-            <p:ph type="body" idx="1"/>
-          </p:nvPr>
-        </p:nvSpPr>
-        <p:spPr/>
-        <p:txBody>
-          <a:bodyPr/>
-          <a:lstStyle/>
-          <a:p>
-            <a:endParaRPr lang="da-DK" dirty="0"/>
-          </a:p>
-        </p:txBody>
-      </p:sp>
     </p:spTree>
     <p:extLst>
       <p:ext uri="{BB962C8B-B14F-4D97-AF65-F5344CB8AC3E}">
-        <p14:creationId xmlns:p14="http://schemas.microsoft.com/office/powerpoint/2010/main" val="2896297009"/>
-      </p:ext>
-    </p:extLst>
-  </p:cSld>
-  <p:clrMapOvr>
-    <a:masterClrMapping/>
-  </p:clrMapOvr>
-  <p:timing>
-    <p:tnLst>
-      <p:par>
-        <p:cTn id="1" dur="indefinite" restart="never" nodeType="tmRoot"/>
-      </p:par>
-    </p:tnLst>
-  </p:timing>
-</p:sld>
-</file>
-
-<file path=ppt/slides/slide7.xml><?xml version="1.0" encoding="utf-8"?>
-<p:sld xmlns:a="http://schemas.openxmlformats.org/drawingml/2006/main" xmlns:r="http://schemas.openxmlformats.org/officeDocument/2006/relationships" xmlns:p="http://schemas.openxmlformats.org/presentationml/2006/main">
-  <p:cSld>
-    <p:spTree>
-      <p:nvGrpSpPr>
-        <p:cNvPr id="1" name=""/>
-        <p:cNvGrpSpPr/>
-        <p:nvPr/>
-      </p:nvGrpSpPr>
-      <p:grpSpPr>
-        <a:xfrm>
-          <a:off x="0" y="0"/>
-          <a:ext cx="0" cy="0"/>
-          <a:chOff x="0" y="0"/>
-          <a:chExt cx="0" cy="0"/>
-        </a:xfrm>
-      </p:grpSpPr>
-      <p:sp>
-        <p:nvSpPr>
-          <p:cNvPr id="2" name="Titel 1"/>
-          <p:cNvSpPr>
-            <a:spLocks noGrp="1"/>
-          </p:cNvSpPr>
-          <p:nvPr>
-            <p:ph type="title"/>
-          </p:nvPr>
-        </p:nvSpPr>
-        <p:spPr/>
-        <p:txBody>
-          <a:bodyPr/>
-          <a:lstStyle/>
-          <a:p>
-            <a:endParaRPr lang="da-DK" dirty="0"/>
-          </a:p>
-        </p:txBody>
-      </p:sp>
-      <p:sp>
-        <p:nvSpPr>
-          <p:cNvPr id="3" name="Pladsholder til indhold 2"/>
-          <p:cNvSpPr>
-            <a:spLocks noGrp="1"/>
-          </p:cNvSpPr>
-          <p:nvPr>
-            <p:ph sz="quarter" idx="13"/>
-          </p:nvPr>
-        </p:nvSpPr>
-        <p:spPr/>
-        <p:txBody>
-          <a:bodyPr/>
-          <a:lstStyle/>
-          <a:p>
-            <a:endParaRPr lang="da-DK" dirty="0"/>
-          </a:p>
-        </p:txBody>
-      </p:sp>
-    </p:spTree>
-    <p:extLst>
-      <p:ext uri="{BB962C8B-B14F-4D97-AF65-F5344CB8AC3E}">
-        <p14:creationId xmlns:p14="http://schemas.microsoft.com/office/powerpoint/2010/main" val="4157995024"/>
+        <p14:creationId xmlns:p14="http://schemas.microsoft.com/office/powerpoint/2010/main" val="751378279"/>
       </p:ext>
     </p:extLst>
   </p:cSld>

</xml_diff>

<commit_message>
First releae og ppt
</commit_message>
<xml_diff>
--- a/Document/SPS_Presentation.pptx
+++ b/Document/SPS_Presentation.pptx
@@ -5,7 +5,7 @@
     <p:sldMasterId id="2147483660" r:id="rId1"/>
   </p:sldMasterIdLst>
   <p:notesMasterIdLst>
-    <p:notesMasterId r:id="rId8"/>
+    <p:notesMasterId r:id="rId9"/>
   </p:notesMasterIdLst>
   <p:sldIdLst>
     <p:sldId id="256" r:id="rId2"/>
@@ -13,7 +13,8 @@
     <p:sldId id="262" r:id="rId4"/>
     <p:sldId id="259" r:id="rId5"/>
     <p:sldId id="260" r:id="rId6"/>
-    <p:sldId id="263" r:id="rId7"/>
+    <p:sldId id="264" r:id="rId7"/>
+    <p:sldId id="263" r:id="rId8"/>
   </p:sldIdLst>
   <p:sldSz cx="9144000" cy="6858000" type="screen4x3"/>
   <p:notesSz cx="6858000" cy="9144000"/>
@@ -883,6 +884,90 @@
             <a:fld id="{EAA68364-80D8-4CEC-A5C7-CA9F0097DAD8}" type="slidenum">
               <a:rPr lang="en-US" smtClean="0"/>
               <a:t>6</a:t>
+            </a:fld>
+            <a:endParaRPr lang="en-US" dirty="0"/>
+          </a:p>
+        </p:txBody>
+      </p:sp>
+    </p:spTree>
+    <p:extLst>
+      <p:ext uri="{BB962C8B-B14F-4D97-AF65-F5344CB8AC3E}">
+        <p14:creationId xmlns:p14="http://schemas.microsoft.com/office/powerpoint/2010/main" val="4052184756"/>
+      </p:ext>
+    </p:extLst>
+  </p:cSld>
+  <p:clrMapOvr>
+    <a:masterClrMapping/>
+  </p:clrMapOvr>
+</p:notes>
+</file>
+
+<file path=ppt/notesSlides/notesSlide6.xml><?xml version="1.0" encoding="utf-8"?>
+<p:notes xmlns:a="http://schemas.openxmlformats.org/drawingml/2006/main" xmlns:r="http://schemas.openxmlformats.org/officeDocument/2006/relationships" xmlns:p="http://schemas.openxmlformats.org/presentationml/2006/main">
+  <p:cSld>
+    <p:spTree>
+      <p:nvGrpSpPr>
+        <p:cNvPr id="1" name=""/>
+        <p:cNvGrpSpPr/>
+        <p:nvPr/>
+      </p:nvGrpSpPr>
+      <p:grpSpPr>
+        <a:xfrm>
+          <a:off x="0" y="0"/>
+          <a:ext cx="0" cy="0"/>
+          <a:chOff x="0" y="0"/>
+          <a:chExt cx="0" cy="0"/>
+        </a:xfrm>
+      </p:grpSpPr>
+      <p:sp>
+        <p:nvSpPr>
+          <p:cNvPr id="2" name="Pladsholder til diasbillede 1"/>
+          <p:cNvSpPr>
+            <a:spLocks noGrp="1" noRot="1" noChangeAspect="1"/>
+          </p:cNvSpPr>
+          <p:nvPr>
+            <p:ph type="sldImg"/>
+          </p:nvPr>
+        </p:nvSpPr>
+        <p:spPr/>
+      </p:sp>
+      <p:sp>
+        <p:nvSpPr>
+          <p:cNvPr id="3" name="Pladsholder til noter 2"/>
+          <p:cNvSpPr>
+            <a:spLocks noGrp="1"/>
+          </p:cNvSpPr>
+          <p:nvPr>
+            <p:ph type="body" idx="1"/>
+          </p:nvPr>
+        </p:nvSpPr>
+        <p:spPr/>
+        <p:txBody>
+          <a:bodyPr/>
+          <a:lstStyle/>
+          <a:p>
+            <a:endParaRPr lang="en-US" dirty="0"/>
+          </a:p>
+        </p:txBody>
+      </p:sp>
+      <p:sp>
+        <p:nvSpPr>
+          <p:cNvPr id="4" name="Pladsholder til diasnummer 3"/>
+          <p:cNvSpPr>
+            <a:spLocks noGrp="1"/>
+          </p:cNvSpPr>
+          <p:nvPr>
+            <p:ph type="sldNum" sz="quarter" idx="10"/>
+          </p:nvPr>
+        </p:nvSpPr>
+        <p:spPr/>
+        <p:txBody>
+          <a:bodyPr/>
+          <a:lstStyle/>
+          <a:p>
+            <a:fld id="{EAA68364-80D8-4CEC-A5C7-CA9F0097DAD8}" type="slidenum">
+              <a:rPr lang="en-US" smtClean="0"/>
+              <a:t>7</a:t>
             </a:fld>
             <a:endParaRPr lang="en-US" dirty="0"/>
           </a:p>
@@ -4340,7 +4425,7 @@
           <a:lstStyle/>
           <a:p>
             <a:r>
-              <a:rPr lang="en-US" dirty="0" err="1" smtClean="0"/>
+              <a:rPr lang="en-US" dirty="0" smtClean="0"/>
               <a:t>Terma</a:t>
             </a:r>
             <a:r>
@@ -4368,6 +4453,9 @@
   <p:clrMapOvr>
     <a:masterClrMapping/>
   </p:clrMapOvr>
+  <p:transition>
+    <p:fade/>
+  </p:transition>
   <p:timing>
     <p:tnLst>
       <p:par>
@@ -4435,12 +4523,94 @@
           <a:p>
             <a:r>
               <a:rPr lang="en-US" dirty="0" smtClean="0"/>
-              <a:t>Presentation of overall system</a:t>
-            </a:r>
-            <a:endParaRPr lang="en-US" dirty="0"/>
-          </a:p>
-        </p:txBody>
-      </p:sp>
+              <a:t>Cockpit Unit +  Wing-mounted Pod</a:t>
+            </a:r>
+            <a:endParaRPr lang="en-US" dirty="0"/>
+          </a:p>
+        </p:txBody>
+      </p:sp>
+      <p:pic>
+        <p:nvPicPr>
+          <p:cNvPr id="1026" name="Picture 2" descr="C:\Users\Kasper\Documents\GitHub\TermaCase\Document\Figures\Plane.png"/>
+          <p:cNvPicPr>
+            <a:picLocks noChangeAspect="1" noChangeArrowheads="1"/>
+          </p:cNvPicPr>
+          <p:nvPr/>
+        </p:nvPicPr>
+        <p:blipFill>
+          <a:blip r:embed="rId3">
+            <a:extLst>
+              <a:ext uri="{28A0092B-C50C-407E-A947-70E740481C1C}">
+                <a14:useLocalDpi xmlns:a14="http://schemas.microsoft.com/office/drawing/2010/main" val="0"/>
+              </a:ext>
+            </a:extLst>
+          </a:blip>
+          <a:srcRect/>
+          <a:stretch>
+            <a:fillRect/>
+          </a:stretch>
+        </p:blipFill>
+        <p:spPr bwMode="auto">
+          <a:xfrm>
+            <a:off x="4932040" y="2420888"/>
+            <a:ext cx="3456384" cy="2471315"/>
+          </a:xfrm>
+          <a:prstGeom prst="rect">
+            <a:avLst/>
+          </a:prstGeom>
+          <a:noFill/>
+          <a:extLst>
+            <a:ext uri="{909E8E84-426E-40DD-AFC4-6F175D3DCCD1}">
+              <a14:hiddenFill xmlns:a14="http://schemas.microsoft.com/office/drawing/2010/main">
+                <a:solidFill>
+                  <a:srgbClr val="FFFFFF"/>
+                </a:solidFill>
+              </a14:hiddenFill>
+            </a:ext>
+          </a:extLst>
+        </p:spPr>
+      </p:pic>
+      <p:pic>
+        <p:nvPicPr>
+          <p:cNvPr id="1027" name="Picture 3" descr="C:\Users\Kasper\Documents\GitHub\TermaCase\Document\Figures\F-16_Cockpit1.png"/>
+          <p:cNvPicPr>
+            <a:picLocks noChangeAspect="1" noChangeArrowheads="1"/>
+          </p:cNvPicPr>
+          <p:nvPr/>
+        </p:nvPicPr>
+        <p:blipFill>
+          <a:blip r:embed="rId4" cstate="print">
+            <a:extLst>
+              <a:ext uri="{28A0092B-C50C-407E-A947-70E740481C1C}">
+                <a14:useLocalDpi xmlns:a14="http://schemas.microsoft.com/office/drawing/2010/main" val="0"/>
+              </a:ext>
+            </a:extLst>
+          </a:blip>
+          <a:srcRect/>
+          <a:stretch>
+            <a:fillRect/>
+          </a:stretch>
+        </p:blipFill>
+        <p:spPr bwMode="auto">
+          <a:xfrm>
+            <a:off x="971087" y="2420886"/>
+            <a:ext cx="3295087" cy="2471315"/>
+          </a:xfrm>
+          <a:prstGeom prst="rect">
+            <a:avLst/>
+          </a:prstGeom>
+          <a:noFill/>
+          <a:extLst>
+            <a:ext uri="{909E8E84-426E-40DD-AFC4-6F175D3DCCD1}">
+              <a14:hiddenFill xmlns:a14="http://schemas.microsoft.com/office/drawing/2010/main">
+                <a:solidFill>
+                  <a:srgbClr val="FFFFFF"/>
+                </a:solidFill>
+              </a14:hiddenFill>
+            </a:ext>
+          </a:extLst>
+        </p:spPr>
+      </p:pic>
     </p:spTree>
     <p:extLst>
       <p:ext uri="{BB962C8B-B14F-4D97-AF65-F5344CB8AC3E}">
@@ -4451,6 +4621,9 @@
   <p:clrMapOvr>
     <a:masterClrMapping/>
   </p:clrMapOvr>
+  <p:transition>
+    <p:fade/>
+  </p:transition>
   <p:timing>
     <p:tnLst>
       <p:par>
@@ -4494,28 +4667,13 @@
           <a:lstStyle/>
           <a:p>
             <a:r>
+              <a:rPr lang="en-US" sz="3200" dirty="0" smtClean="0"/>
+              <a:t>Concept</a:t>
+            </a:r>
+            <a:r>
               <a:rPr lang="en-US" dirty="0" smtClean="0"/>
-              <a:t>Concept of operations</a:t>
-            </a:r>
-            <a:endParaRPr lang="en-US" dirty="0"/>
-          </a:p>
-        </p:txBody>
-      </p:sp>
-      <p:sp>
-        <p:nvSpPr>
-          <p:cNvPr id="3" name="Pladsholder til indhold 2"/>
-          <p:cNvSpPr>
-            <a:spLocks noGrp="1"/>
-          </p:cNvSpPr>
-          <p:nvPr>
-            <p:ph sz="quarter" idx="13"/>
-          </p:nvPr>
-        </p:nvSpPr>
-        <p:spPr/>
-        <p:txBody>
-          <a:bodyPr/>
-          <a:lstStyle/>
-          <a:p>
+              <a:t> of operations</a:t>
+            </a:r>
             <a:endParaRPr lang="en-US" dirty="0"/>
           </a:p>
         </p:txBody>
@@ -4560,6 +4718,9 @@
   <p:clrMapOvr>
     <a:masterClrMapping/>
   </p:clrMapOvr>
+  <p:transition>
+    <p:fade/>
+  </p:transition>
   <p:timing>
     <p:tnLst>
       <p:par>
@@ -4603,8 +4764,8 @@
           <a:lstStyle/>
           <a:p>
             <a:r>
-              <a:rPr lang="en-US" dirty="0" smtClean="0"/>
-              <a:t>Features</a:t>
+              <a:rPr lang="en-US" sz="3200" dirty="0" smtClean="0"/>
+              <a:t>Distinguishing Features</a:t>
             </a:r>
             <a:endParaRPr lang="en-US" dirty="0"/>
           </a:p>
@@ -4622,18 +4783,20 @@
         </p:nvSpPr>
         <p:spPr/>
         <p:txBody>
-          <a:bodyPr/>
-          <a:lstStyle/>
-          <a:p>
-            <a:r>
-              <a:rPr lang="en-US" dirty="0" smtClean="0"/>
+          <a:bodyPr>
+            <a:normAutofit fontScale="25000" lnSpcReduction="20000"/>
+          </a:bodyPr>
+          <a:lstStyle/>
+          <a:p>
+            <a:r>
+              <a:rPr lang="en-US" sz="9600" dirty="0" smtClean="0"/>
               <a:t>Automatic and Semi-automatic operation </a:t>
             </a:r>
           </a:p>
           <a:p>
             <a:pPr lvl="1"/>
             <a:r>
-              <a:rPr lang="en-US" dirty="0" smtClean="0"/>
+              <a:rPr lang="en-US" sz="9600" dirty="0" smtClean="0"/>
               <a:t>Lessens pilot load</a:t>
             </a:r>
           </a:p>
@@ -4641,54 +4804,36 @@
             <a:pPr marL="457200" lvl="1" indent="0">
               <a:buNone/>
             </a:pPr>
-            <a:endParaRPr lang="en-US" dirty="0" smtClean="0"/>
-          </a:p>
-          <a:p>
-            <a:r>
-              <a:rPr lang="en-US" dirty="0" smtClean="0"/>
+            <a:endParaRPr lang="en-US" sz="9600" dirty="0" smtClean="0"/>
+          </a:p>
+          <a:p>
+            <a:r>
+              <a:rPr lang="en-US" sz="9600" dirty="0" smtClean="0"/>
               <a:t>Intelligent selection of dispensing patterns</a:t>
             </a:r>
           </a:p>
           <a:p>
             <a:pPr lvl="1"/>
             <a:r>
-              <a:rPr lang="en-US" dirty="0" smtClean="0"/>
+              <a:rPr lang="en-US" sz="9600" dirty="0" smtClean="0"/>
               <a:t>Optimal coverage for all threats</a:t>
             </a:r>
           </a:p>
           <a:p>
-            <a:endParaRPr lang="en-US" dirty="0" smtClean="0"/>
-          </a:p>
-          <a:p>
-            <a:r>
-              <a:rPr lang="en-US" dirty="0" smtClean="0"/>
+            <a:endParaRPr lang="en-US" sz="9600" dirty="0" smtClean="0"/>
+          </a:p>
+          <a:p>
+            <a:r>
+              <a:rPr lang="en-US" sz="9600" dirty="0" smtClean="0"/>
               <a:t>Direct audio cues in pilot headset</a:t>
             </a:r>
           </a:p>
           <a:p>
             <a:pPr lvl="1"/>
             <a:r>
-              <a:rPr lang="en-US" dirty="0" smtClean="0"/>
-              <a:t>Faster and more direct </a:t>
-            </a:r>
-            <a:r>
-              <a:rPr lang="en-US" smtClean="0"/>
-              <a:t>threat response</a:t>
-            </a:r>
-            <a:r>
-              <a:rPr lang="en-US" dirty="0" smtClean="0"/>
-              <a:t/>
-            </a:r>
-            <a:br>
-              <a:rPr lang="en-US" dirty="0" smtClean="0"/>
-            </a:br>
-            <a:r>
-              <a:rPr lang="en-US" dirty="0" smtClean="0"/>
-              <a:t/>
-            </a:r>
-            <a:br>
-              <a:rPr lang="en-US" dirty="0" smtClean="0"/>
-            </a:br>
+              <a:rPr lang="en-US" sz="9600" dirty="0" smtClean="0"/>
+              <a:t>Faster and more direct threat response</a:t>
+            </a:r>
             <a:r>
               <a:rPr lang="en-US" dirty="0" smtClean="0"/>
               <a:t/>
@@ -4710,6 +4855,9 @@
   <p:clrMapOvr>
     <a:masterClrMapping/>
   </p:clrMapOvr>
+  <p:transition>
+    <p:fade/>
+  </p:transition>
   <p:timing>
     <p:tnLst>
       <p:par>
@@ -4753,8 +4901,16 @@
           <a:lstStyle/>
           <a:p>
             <a:r>
+              <a:rPr lang="en-US" sz="3200" dirty="0" smtClean="0"/>
+              <a:t>Project</a:t>
+            </a:r>
+            <a:r>
               <a:rPr lang="en-US" dirty="0" smtClean="0"/>
-              <a:t>Project schedule</a:t>
+              <a:t> </a:t>
+            </a:r>
+            <a:r>
+              <a:rPr lang="en-US" sz="3200" dirty="0" smtClean="0"/>
+              <a:t>schedule</a:t>
             </a:r>
             <a:endParaRPr lang="en-US" dirty="0"/>
           </a:p>
@@ -4799,6 +4955,9 @@
   <p:clrMapOvr>
     <a:masterClrMapping/>
   </p:clrMapOvr>
+  <p:transition>
+    <p:fade/>
+  </p:transition>
   <p:timing>
     <p:tnLst>
       <p:par>
@@ -4826,6 +4985,166 @@
           <a:chExt cx="0" cy="0"/>
         </a:xfrm>
       </p:grpSpPr>
+      <p:sp>
+        <p:nvSpPr>
+          <p:cNvPr id="2" name="Titel 1"/>
+          <p:cNvSpPr>
+            <a:spLocks noGrp="1"/>
+          </p:cNvSpPr>
+          <p:nvPr>
+            <p:ph type="title"/>
+          </p:nvPr>
+        </p:nvSpPr>
+        <p:spPr/>
+        <p:txBody>
+          <a:bodyPr/>
+          <a:lstStyle/>
+          <a:p>
+            <a:r>
+              <a:rPr lang="en-US" sz="3200" dirty="0" smtClean="0"/>
+              <a:t>Project</a:t>
+            </a:r>
+            <a:r>
+              <a:rPr lang="en-US" dirty="0" smtClean="0"/>
+              <a:t> </a:t>
+            </a:r>
+            <a:r>
+              <a:rPr lang="en-US" sz="3200" dirty="0" smtClean="0"/>
+              <a:t>Progress</a:t>
+            </a:r>
+            <a:endParaRPr lang="en-US" dirty="0"/>
+          </a:p>
+        </p:txBody>
+      </p:sp>
+      <p:pic>
+        <p:nvPicPr>
+          <p:cNvPr id="4" name="Pladsholder til indhold 3"/>
+          <p:cNvPicPr>
+            <a:picLocks noGrp="1" noChangeAspect="1"/>
+          </p:cNvPicPr>
+          <p:nvPr>
+            <p:ph sz="quarter" idx="13"/>
+          </p:nvPr>
+        </p:nvPicPr>
+        <p:blipFill>
+          <a:blip r:embed="rId3">
+            <a:extLst>
+              <a:ext uri="{28A0092B-C50C-407E-A947-70E740481C1C}">
+                <a14:useLocalDpi xmlns:a14="http://schemas.microsoft.com/office/drawing/2010/main" val="0"/>
+              </a:ext>
+            </a:extLst>
+          </a:blip>
+          <a:stretch>
+            <a:fillRect/>
+          </a:stretch>
+        </p:blipFill>
+        <p:spPr>
+          <a:xfrm>
+            <a:off x="609601" y="2899726"/>
+            <a:ext cx="7924797" cy="1515747"/>
+          </a:xfrm>
+        </p:spPr>
+      </p:pic>
+      <p:sp>
+        <p:nvSpPr>
+          <p:cNvPr id="6" name="Højrepil 5"/>
+          <p:cNvSpPr/>
+          <p:nvPr/>
+        </p:nvSpPr>
+        <p:spPr>
+          <a:xfrm rot="16200000">
+            <a:off x="3902948" y="4437111"/>
+            <a:ext cx="792088" cy="360040"/>
+          </a:xfrm>
+          <a:prstGeom prst="rightArrow">
+            <a:avLst/>
+          </a:prstGeom>
+        </p:spPr>
+        <p:style>
+          <a:lnRef idx="0">
+            <a:schemeClr val="accent2"/>
+          </a:lnRef>
+          <a:fillRef idx="3">
+            <a:schemeClr val="accent2"/>
+          </a:fillRef>
+          <a:effectRef idx="3">
+            <a:schemeClr val="accent2"/>
+          </a:effectRef>
+          <a:fontRef idx="minor">
+            <a:schemeClr val="lt1"/>
+          </a:fontRef>
+        </p:style>
+        <p:txBody>
+          <a:bodyPr rtlCol="0" anchor="ctr"/>
+          <a:lstStyle/>
+          <a:p>
+            <a:pPr algn="ctr"/>
+            <a:r>
+              <a:rPr lang="en-US" dirty="0" smtClean="0">
+                <a:ln>
+                  <a:solidFill>
+                    <a:schemeClr val="tx1"/>
+                  </a:solidFill>
+                </a:ln>
+                <a:solidFill>
+                  <a:schemeClr val="tx1"/>
+                </a:solidFill>
+              </a:rPr>
+              <a:t>NOW</a:t>
+            </a:r>
+            <a:endParaRPr lang="en-US" dirty="0">
+              <a:ln>
+                <a:solidFill>
+                  <a:schemeClr val="tx1"/>
+                </a:solidFill>
+              </a:ln>
+              <a:solidFill>
+                <a:schemeClr val="tx1"/>
+              </a:solidFill>
+            </a:endParaRPr>
+          </a:p>
+        </p:txBody>
+      </p:sp>
+    </p:spTree>
+    <p:extLst>
+      <p:ext uri="{BB962C8B-B14F-4D97-AF65-F5344CB8AC3E}">
+        <p14:creationId xmlns:p14="http://schemas.microsoft.com/office/powerpoint/2010/main" val="4235582984"/>
+      </p:ext>
+    </p:extLst>
+  </p:cSld>
+  <p:clrMapOvr>
+    <a:masterClrMapping/>
+  </p:clrMapOvr>
+  <p:transition>
+    <p:fade/>
+  </p:transition>
+  <p:timing>
+    <p:tnLst>
+      <p:par>
+        <p:cTn id="1" dur="indefinite" restart="never" nodeType="tmRoot"/>
+      </p:par>
+    </p:tnLst>
+  </p:timing>
+</p:sld>
+</file>
+
+<file path=ppt/slides/slide7.xml><?xml version="1.0" encoding="utf-8"?>
+<p:sld xmlns:a="http://schemas.openxmlformats.org/drawingml/2006/main" xmlns:r="http://schemas.openxmlformats.org/officeDocument/2006/relationships" xmlns:p="http://schemas.openxmlformats.org/presentationml/2006/main">
+  <p:cSld>
+    <p:spTree>
+      <p:nvGrpSpPr>
+        <p:cNvPr id="1" name=""/>
+        <p:cNvGrpSpPr/>
+        <p:nvPr/>
+      </p:nvGrpSpPr>
+      <p:grpSpPr>
+        <a:xfrm>
+          <a:off x="0" y="0"/>
+          <a:ext cx="0" cy="0"/>
+          <a:chOff x="0" y="0"/>
+          <a:chExt cx="0" cy="0"/>
+        </a:xfrm>
+      </p:grpSpPr>
     </p:spTree>
     <p:extLst>
       <p:ext uri="{BB962C8B-B14F-4D97-AF65-F5344CB8AC3E}">
@@ -4836,6 +5155,16 @@
   <p:clrMapOvr>
     <a:masterClrMapping/>
   </p:clrMapOvr>
+  <p:transition>
+    <p:fade/>
+  </p:transition>
+  <p:timing>
+    <p:tnLst>
+      <p:par>
+        <p:cTn id="1" dur="indefinite" restart="never" nodeType="tmRoot"/>
+      </p:par>
+    </p:tnLst>
+  </p:timing>
 </p:sld>
 </file>
 

</xml_diff>